<commit_message>
beginning interrupt handling and CPU bug fixes
</commit_message>
<xml_diff>
--- a/doc/PixieVM Memory Layout.pptx
+++ b/doc/PixieVM Memory Layout.pptx
@@ -106,7 +106,7 @@
   </p:defaultTextStyle>
   <p:extLst>
     <p:ext uri="{EFAFB233-063F-42B5-8137-9DF3F51BA10A}">
-      <p15:sldGuideLst xmlns:p15="http://schemas.microsoft.com/office/powerpoint/2012/main">
+      <p15:sldGuideLst xmlns:p15="http://schemas.microsoft.com/office/powerpoint/2012/main" xmlns="">
         <p15:guide id="1" orient="horz" pos="2160">
           <p15:clr>
             <a:srgbClr val="A4A3A4"/>
@@ -304,7 +304,7 @@
           <a:p>
             <a:fld id="{ACE72DFE-57C9-42FC-8C16-6187F164E2A6}" type="datetimeFigureOut">
               <a:rPr lang="en-US" smtClean="0"/>
-              <a:t>11/11/2013</a:t>
+              <a:t>11/17/2013</a:t>
             </a:fld>
             <a:endParaRPr lang="en-US"/>
           </a:p>
@@ -474,7 +474,7 @@
           <a:p>
             <a:fld id="{ACE72DFE-57C9-42FC-8C16-6187F164E2A6}" type="datetimeFigureOut">
               <a:rPr lang="en-US" smtClean="0"/>
-              <a:t>11/11/2013</a:t>
+              <a:t>11/17/2013</a:t>
             </a:fld>
             <a:endParaRPr lang="en-US"/>
           </a:p>
@@ -654,7 +654,7 @@
           <a:p>
             <a:fld id="{ACE72DFE-57C9-42FC-8C16-6187F164E2A6}" type="datetimeFigureOut">
               <a:rPr lang="en-US" smtClean="0"/>
-              <a:t>11/11/2013</a:t>
+              <a:t>11/17/2013</a:t>
             </a:fld>
             <a:endParaRPr lang="en-US"/>
           </a:p>
@@ -824,7 +824,7 @@
           <a:p>
             <a:fld id="{ACE72DFE-57C9-42FC-8C16-6187F164E2A6}" type="datetimeFigureOut">
               <a:rPr lang="en-US" smtClean="0"/>
-              <a:t>11/11/2013</a:t>
+              <a:t>11/17/2013</a:t>
             </a:fld>
             <a:endParaRPr lang="en-US"/>
           </a:p>
@@ -1070,7 +1070,7 @@
           <a:p>
             <a:fld id="{ACE72DFE-57C9-42FC-8C16-6187F164E2A6}" type="datetimeFigureOut">
               <a:rPr lang="en-US" smtClean="0"/>
-              <a:t>11/11/2013</a:t>
+              <a:t>11/17/2013</a:t>
             </a:fld>
             <a:endParaRPr lang="en-US"/>
           </a:p>
@@ -1358,7 +1358,7 @@
           <a:p>
             <a:fld id="{ACE72DFE-57C9-42FC-8C16-6187F164E2A6}" type="datetimeFigureOut">
               <a:rPr lang="en-US" smtClean="0"/>
-              <a:t>11/11/2013</a:t>
+              <a:t>11/17/2013</a:t>
             </a:fld>
             <a:endParaRPr lang="en-US"/>
           </a:p>
@@ -1780,7 +1780,7 @@
           <a:p>
             <a:fld id="{ACE72DFE-57C9-42FC-8C16-6187F164E2A6}" type="datetimeFigureOut">
               <a:rPr lang="en-US" smtClean="0"/>
-              <a:t>11/11/2013</a:t>
+              <a:t>11/17/2013</a:t>
             </a:fld>
             <a:endParaRPr lang="en-US"/>
           </a:p>
@@ -1898,7 +1898,7 @@
           <a:p>
             <a:fld id="{ACE72DFE-57C9-42FC-8C16-6187F164E2A6}" type="datetimeFigureOut">
               <a:rPr lang="en-US" smtClean="0"/>
-              <a:t>11/11/2013</a:t>
+              <a:t>11/17/2013</a:t>
             </a:fld>
             <a:endParaRPr lang="en-US"/>
           </a:p>
@@ -1993,7 +1993,7 @@
           <a:p>
             <a:fld id="{ACE72DFE-57C9-42FC-8C16-6187F164E2A6}" type="datetimeFigureOut">
               <a:rPr lang="en-US" smtClean="0"/>
-              <a:t>11/11/2013</a:t>
+              <a:t>11/17/2013</a:t>
             </a:fld>
             <a:endParaRPr lang="en-US"/>
           </a:p>
@@ -2270,7 +2270,7 @@
           <a:p>
             <a:fld id="{ACE72DFE-57C9-42FC-8C16-6187F164E2A6}" type="datetimeFigureOut">
               <a:rPr lang="en-US" smtClean="0"/>
-              <a:t>11/11/2013</a:t>
+              <a:t>11/17/2013</a:t>
             </a:fld>
             <a:endParaRPr lang="en-US"/>
           </a:p>
@@ -2523,7 +2523,7 @@
           <a:p>
             <a:fld id="{ACE72DFE-57C9-42FC-8C16-6187F164E2A6}" type="datetimeFigureOut">
               <a:rPr lang="en-US" smtClean="0"/>
-              <a:t>11/11/2013</a:t>
+              <a:t>11/17/2013</a:t>
             </a:fld>
             <a:endParaRPr lang="en-US"/>
           </a:p>
@@ -2736,7 +2736,7 @@
           <a:p>
             <a:fld id="{ACE72DFE-57C9-42FC-8C16-6187F164E2A6}" type="datetimeFigureOut">
               <a:rPr lang="en-US" smtClean="0"/>
-              <a:t>11/11/2013</a:t>
+              <a:t>11/17/2013</a:t>
             </a:fld>
             <a:endParaRPr lang="en-US"/>
           </a:p>
@@ -3171,590 +3171,524 @@
           </a:p>
         </p:txBody>
       </p:sp>
-      <p:sp>
-        <p:nvSpPr>
-          <p:cNvPr id="5" name="Rectangle 4"/>
-          <p:cNvSpPr/>
+      <p:grpSp>
+        <p:nvGrpSpPr>
+          <p:cNvPr id="2" name="Group 1"/>
+          <p:cNvGrpSpPr/>
           <p:nvPr/>
-        </p:nvSpPr>
-        <p:spPr>
+        </p:nvGrpSpPr>
+        <p:grpSpPr>
           <a:xfrm>
-            <a:off x="2732662" y="5676900"/>
-            <a:ext cx="3831887" cy="685800"/>
+            <a:off x="2734056" y="1600200"/>
+            <a:ext cx="3831336" cy="4102639"/>
+            <a:chOff x="2734056" y="1044913"/>
+            <a:chExt cx="3831336" cy="4102639"/>
           </a:xfrm>
-          <a:prstGeom prst="rect">
-            <a:avLst/>
-          </a:prstGeom>
-          <a:solidFill>
-            <a:srgbClr val="004000"/>
-          </a:solidFill>
-          <a:ln>
-            <a:noFill/>
-          </a:ln>
-          <a:effectLst/>
-          <a:scene3d>
-            <a:camera prst="orthographicFront">
-              <a:rot lat="0" lon="0" rev="0"/>
-            </a:camera>
-            <a:lightRig rig="contrasting" dir="t">
-              <a:rot lat="0" lon="0" rev="7800000"/>
-            </a:lightRig>
-          </a:scene3d>
-          <a:sp3d>
-            <a:bevelT w="139700" h="139700"/>
-          </a:sp3d>
-        </p:spPr>
-        <p:style>
-          <a:lnRef idx="2">
-            <a:schemeClr val="accent1">
-              <a:shade val="50000"/>
-            </a:schemeClr>
-          </a:lnRef>
-          <a:fillRef idx="1">
-            <a:schemeClr val="accent1"/>
-          </a:fillRef>
-          <a:effectRef idx="0">
-            <a:schemeClr val="accent1"/>
-          </a:effectRef>
-          <a:fontRef idx="minor">
-            <a:schemeClr val="lt1"/>
-          </a:fontRef>
-        </p:style>
-        <p:txBody>
-          <a:bodyPr rtlCol="0" anchor="ctr"/>
-          <a:lstStyle/>
-          <a:p>
-            <a:pPr algn="ctr"/>
-            <a:r>
-              <a:rPr lang="en-US" dirty="0" smtClean="0">
-                <a:solidFill>
-                  <a:srgbClr val="008000"/>
-                </a:solidFill>
-              </a:rPr>
-              <a:t>$0000-$7FFF</a:t>
-            </a:r>
-            <a:endParaRPr lang="en-US" dirty="0">
-              <a:solidFill>
-                <a:srgbClr val="008000"/>
-              </a:solidFill>
-            </a:endParaRPr>
-          </a:p>
-        </p:txBody>
-      </p:sp>
-      <p:sp>
-        <p:nvSpPr>
-          <p:cNvPr id="7" name="Rectangle 6"/>
-          <p:cNvSpPr/>
-          <p:nvPr/>
-        </p:nvSpPr>
-        <p:spPr>
-          <a:xfrm>
-            <a:off x="2732662" y="4381500"/>
-            <a:ext cx="3827024" cy="609600"/>
-          </a:xfrm>
-          <a:prstGeom prst="rect">
-            <a:avLst/>
-          </a:prstGeom>
-          <a:solidFill>
-            <a:srgbClr val="008000"/>
-          </a:solidFill>
-          <a:ln>
-            <a:noFill/>
-          </a:ln>
-          <a:effectLst/>
-          <a:scene3d>
-            <a:camera prst="orthographicFront">
-              <a:rot lat="0" lon="0" rev="0"/>
-            </a:camera>
-            <a:lightRig rig="contrasting" dir="t">
-              <a:rot lat="0" lon="0" rev="7800000"/>
-            </a:lightRig>
-          </a:scene3d>
-          <a:sp3d>
-            <a:bevelT w="139700" h="139700"/>
-          </a:sp3d>
-        </p:spPr>
-        <p:style>
-          <a:lnRef idx="1">
-            <a:schemeClr val="accent4"/>
-          </a:lnRef>
-          <a:fillRef idx="3">
-            <a:schemeClr val="accent4"/>
-          </a:fillRef>
-          <a:effectRef idx="2">
-            <a:schemeClr val="accent4"/>
-          </a:effectRef>
-          <a:fontRef idx="minor">
-            <a:schemeClr val="lt1"/>
-          </a:fontRef>
-        </p:style>
-        <p:txBody>
-          <a:bodyPr rtlCol="0" anchor="ctr"/>
-          <a:lstStyle/>
-          <a:p>
-            <a:pPr algn="ctr"/>
-            <a:r>
-              <a:rPr lang="en-US" dirty="0" smtClean="0">
-                <a:solidFill>
-                  <a:srgbClr val="00A000"/>
-                </a:solidFill>
-              </a:rPr>
-              <a:t>$9000-$9FFF</a:t>
-            </a:r>
-            <a:endParaRPr lang="en-US" dirty="0">
-              <a:solidFill>
-                <a:srgbClr val="00A000"/>
-              </a:solidFill>
-            </a:endParaRPr>
-          </a:p>
-        </p:txBody>
-      </p:sp>
-      <p:sp>
-        <p:nvSpPr>
-          <p:cNvPr id="8" name="Rectangle 7"/>
-          <p:cNvSpPr/>
-          <p:nvPr/>
-        </p:nvSpPr>
-        <p:spPr>
-          <a:xfrm>
-            <a:off x="2734056" y="3695700"/>
-            <a:ext cx="3810000" cy="685800"/>
-          </a:xfrm>
-          <a:prstGeom prst="rect">
-            <a:avLst/>
-          </a:prstGeom>
-          <a:solidFill>
-            <a:srgbClr val="00A000"/>
-          </a:solidFill>
-          <a:ln>
-            <a:noFill/>
-          </a:ln>
-          <a:effectLst/>
-          <a:scene3d>
-            <a:camera prst="orthographicFront">
-              <a:rot lat="0" lon="0" rev="0"/>
-            </a:camera>
-            <a:lightRig rig="contrasting" dir="t">
-              <a:rot lat="0" lon="0" rev="7800000"/>
-            </a:lightRig>
-          </a:scene3d>
-          <a:sp3d>
-            <a:bevelT w="139700" h="139700"/>
-          </a:sp3d>
-        </p:spPr>
-        <p:style>
-          <a:lnRef idx="1">
-            <a:schemeClr val="accent4"/>
-          </a:lnRef>
-          <a:fillRef idx="3">
-            <a:schemeClr val="accent4"/>
-          </a:fillRef>
-          <a:effectRef idx="2">
-            <a:schemeClr val="accent4"/>
-          </a:effectRef>
-          <a:fontRef idx="minor">
-            <a:schemeClr val="lt1"/>
-          </a:fontRef>
-        </p:style>
-        <p:txBody>
-          <a:bodyPr rtlCol="0" anchor="ctr"/>
-          <a:lstStyle/>
-          <a:p>
-            <a:pPr algn="ctr"/>
-            <a:r>
-              <a:rPr lang="en-US" b="1" dirty="0" smtClean="0">
-                <a:solidFill>
-                  <a:srgbClr val="FFFF00"/>
-                </a:solidFill>
-              </a:rPr>
-              <a:t>COLOR RAM</a:t>
-            </a:r>
-          </a:p>
-          <a:p>
-            <a:pPr algn="ctr"/>
-            <a:r>
-              <a:rPr lang="en-US" dirty="0" smtClean="0"/>
-              <a:t>$A000-$AFFF</a:t>
-            </a:r>
-            <a:endParaRPr lang="en-US" dirty="0"/>
-          </a:p>
-        </p:txBody>
-      </p:sp>
-      <p:sp>
-        <p:nvSpPr>
-          <p:cNvPr id="9" name="Rectangle 8"/>
-          <p:cNvSpPr/>
-          <p:nvPr/>
-        </p:nvSpPr>
-        <p:spPr>
-          <a:xfrm>
-            <a:off x="2734056" y="3102313"/>
-            <a:ext cx="3810000" cy="593387"/>
-          </a:xfrm>
-          <a:prstGeom prst="rect">
-            <a:avLst/>
-          </a:prstGeom>
-          <a:solidFill>
-            <a:srgbClr val="00C000"/>
-          </a:solidFill>
-          <a:ln>
-            <a:noFill/>
-          </a:ln>
-          <a:effectLst/>
-          <a:scene3d>
-            <a:camera prst="orthographicFront">
-              <a:rot lat="0" lon="0" rev="0"/>
-            </a:camera>
-            <a:lightRig rig="contrasting" dir="t">
-              <a:rot lat="0" lon="0" rev="7800000"/>
-            </a:lightRig>
-          </a:scene3d>
-          <a:sp3d>
-            <a:bevelT w="139700" h="139700"/>
-          </a:sp3d>
-        </p:spPr>
-        <p:style>
-          <a:lnRef idx="1">
-            <a:schemeClr val="accent4"/>
-          </a:lnRef>
-          <a:fillRef idx="3">
-            <a:schemeClr val="accent4"/>
-          </a:fillRef>
-          <a:effectRef idx="2">
-            <a:schemeClr val="accent4"/>
-          </a:effectRef>
-          <a:fontRef idx="minor">
-            <a:schemeClr val="lt1"/>
-          </a:fontRef>
-        </p:style>
-        <p:txBody>
-          <a:bodyPr rtlCol="0" anchor="ctr"/>
-          <a:lstStyle/>
-          <a:p>
-            <a:pPr algn="ctr"/>
-            <a:r>
-              <a:rPr lang="en-US" dirty="0" smtClean="0">
-                <a:solidFill>
-                  <a:srgbClr val="00DC00"/>
-                </a:solidFill>
-              </a:rPr>
-              <a:t>$B000-$BFFF</a:t>
-            </a:r>
-            <a:endParaRPr lang="en-US" dirty="0">
-              <a:solidFill>
-                <a:srgbClr val="00DC00"/>
-              </a:solidFill>
-            </a:endParaRPr>
-          </a:p>
-        </p:txBody>
-      </p:sp>
-      <p:sp>
-        <p:nvSpPr>
-          <p:cNvPr id="10" name="Rectangle 9"/>
-          <p:cNvSpPr/>
-          <p:nvPr/>
-        </p:nvSpPr>
-        <p:spPr>
-          <a:xfrm>
-            <a:off x="2732662" y="4995964"/>
-            <a:ext cx="3827024" cy="685800"/>
-          </a:xfrm>
-          <a:prstGeom prst="rect">
-            <a:avLst/>
-          </a:prstGeom>
-          <a:solidFill>
-            <a:srgbClr val="005000"/>
-          </a:solidFill>
-          <a:ln>
-            <a:noFill/>
-          </a:ln>
-          <a:effectLst/>
-          <a:scene3d>
-            <a:camera prst="orthographicFront">
-              <a:rot lat="0" lon="0" rev="0"/>
-            </a:camera>
-            <a:lightRig rig="contrasting" dir="t">
-              <a:rot lat="0" lon="0" rev="7800000"/>
-            </a:lightRig>
-          </a:scene3d>
-          <a:sp3d>
-            <a:bevelT w="139700" h="139700"/>
-          </a:sp3d>
-        </p:spPr>
-        <p:style>
-          <a:lnRef idx="2">
-            <a:schemeClr val="accent1">
-              <a:shade val="50000"/>
-            </a:schemeClr>
-          </a:lnRef>
-          <a:fillRef idx="1">
-            <a:schemeClr val="accent1"/>
-          </a:fillRef>
-          <a:effectRef idx="0">
-            <a:schemeClr val="accent1"/>
-          </a:effectRef>
-          <a:fontRef idx="minor">
-            <a:schemeClr val="lt1"/>
-          </a:fontRef>
-        </p:style>
-        <p:txBody>
-          <a:bodyPr rtlCol="0" anchor="ctr"/>
-          <a:lstStyle/>
-          <a:p>
-            <a:pPr algn="ctr"/>
-            <a:r>
-              <a:rPr lang="en-US" b="1" dirty="0" smtClean="0">
-                <a:solidFill>
-                  <a:srgbClr val="FFFF00"/>
-                </a:solidFill>
-              </a:rPr>
-              <a:t>VIDEO RAM</a:t>
-            </a:r>
-          </a:p>
-          <a:p>
-            <a:pPr algn="ctr"/>
-            <a:r>
-              <a:rPr lang="en-US" dirty="0" smtClean="0">
+        </p:grpSpPr>
+        <p:sp>
+          <p:nvSpPr>
+            <p:cNvPr id="7" name="Rectangle 6"/>
+            <p:cNvSpPr/>
+            <p:nvPr/>
+          </p:nvSpPr>
+          <p:spPr>
+            <a:xfrm>
+              <a:off x="2734056" y="4454458"/>
+              <a:ext cx="3827024" cy="693094"/>
+            </a:xfrm>
+            <a:prstGeom prst="rect">
+              <a:avLst/>
+            </a:prstGeom>
+            <a:solidFill>
+              <a:srgbClr val="008000"/>
+            </a:solidFill>
+            <a:ln>
+              <a:noFill/>
+            </a:ln>
+            <a:effectLst/>
+            <a:scene3d>
+              <a:camera prst="orthographicFront">
+                <a:rot lat="0" lon="0" rev="0"/>
+              </a:camera>
+              <a:lightRig rig="contrasting" dir="t">
+                <a:rot lat="0" lon="0" rev="7800000"/>
+              </a:lightRig>
+            </a:scene3d>
+            <a:sp3d>
+              <a:bevelT w="139700" h="139700"/>
+            </a:sp3d>
+          </p:spPr>
+          <p:style>
+            <a:lnRef idx="1">
+              <a:schemeClr val="accent4"/>
+            </a:lnRef>
+            <a:fillRef idx="3">
+              <a:schemeClr val="accent4"/>
+            </a:fillRef>
+            <a:effectRef idx="2">
+              <a:schemeClr val="accent4"/>
+            </a:effectRef>
+            <a:fontRef idx="minor">
+              <a:schemeClr val="lt1"/>
+            </a:fontRef>
+          </p:style>
+          <p:txBody>
+            <a:bodyPr rtlCol="0" anchor="ctr"/>
+            <a:lstStyle/>
+            <a:p>
+              <a:pPr algn="ctr"/>
+              <a:r>
+                <a:rPr lang="en-US" b="1" dirty="0" smtClean="0">
+                  <a:solidFill>
+                    <a:srgbClr val="FFFF00"/>
+                  </a:solidFill>
+                </a:rPr>
+                <a:t>USER PROGRAMS</a:t>
+              </a:r>
+            </a:p>
+            <a:p>
+              <a:pPr algn="ctr"/>
+              <a:r>
+                <a:rPr lang="en-US" dirty="0" smtClean="0">
+                  <a:solidFill>
+                    <a:schemeClr val="bg1"/>
+                  </a:solidFill>
+                </a:rPr>
+                <a:t>$0000-</a:t>
+              </a:r>
+              <a:r>
+                <a:rPr lang="en-US" dirty="0" smtClean="0">
+                  <a:solidFill>
+                    <a:schemeClr val="bg1"/>
+                  </a:solidFill>
+                </a:rPr>
+                <a:t>$9FFF</a:t>
+              </a:r>
+              <a:endParaRPr lang="en-US" dirty="0">
                 <a:solidFill>
                   <a:schemeClr val="bg1"/>
                 </a:solidFill>
-              </a:rPr>
-              <a:t>$8000-$8FFF</a:t>
-            </a:r>
-            <a:endParaRPr lang="en-US" dirty="0">
-              <a:solidFill>
-                <a:schemeClr val="bg1"/>
-              </a:solidFill>
-            </a:endParaRPr>
-          </a:p>
-        </p:txBody>
-      </p:sp>
-      <p:sp>
-        <p:nvSpPr>
-          <p:cNvPr id="12" name="Rectangle 11"/>
-          <p:cNvSpPr/>
-          <p:nvPr/>
-        </p:nvSpPr>
-        <p:spPr>
-          <a:xfrm>
-            <a:off x="2734056" y="2416513"/>
-            <a:ext cx="3810000" cy="685800"/>
-          </a:xfrm>
-          <a:prstGeom prst="rect">
-            <a:avLst/>
-          </a:prstGeom>
-          <a:solidFill>
-            <a:srgbClr val="00DC00"/>
-          </a:solidFill>
-          <a:ln>
-            <a:noFill/>
-          </a:ln>
-          <a:effectLst/>
-          <a:scene3d>
-            <a:camera prst="orthographicFront">
-              <a:rot lat="0" lon="0" rev="0"/>
-            </a:camera>
-            <a:lightRig rig="contrasting" dir="t">
-              <a:rot lat="0" lon="0" rev="7800000"/>
-            </a:lightRig>
-          </a:scene3d>
-          <a:sp3d>
-            <a:bevelT w="139700" h="139700"/>
-          </a:sp3d>
-        </p:spPr>
-        <p:style>
-          <a:lnRef idx="1">
-            <a:schemeClr val="accent4"/>
-          </a:lnRef>
-          <a:fillRef idx="3">
-            <a:schemeClr val="accent4"/>
-          </a:fillRef>
-          <a:effectRef idx="2">
-            <a:schemeClr val="accent4"/>
-          </a:effectRef>
-          <a:fontRef idx="minor">
-            <a:schemeClr val="lt1"/>
-          </a:fontRef>
-        </p:style>
-        <p:txBody>
-          <a:bodyPr rtlCol="0" anchor="ctr"/>
-          <a:lstStyle/>
-          <a:p>
-            <a:pPr algn="ctr"/>
-            <a:r>
-              <a:rPr lang="en-US" b="1" dirty="0" smtClean="0">
+              </a:endParaRPr>
+            </a:p>
+          </p:txBody>
+        </p:sp>
+        <p:sp>
+          <p:nvSpPr>
+            <p:cNvPr id="8" name="Rectangle 7"/>
+            <p:cNvSpPr/>
+            <p:nvPr/>
+          </p:nvSpPr>
+          <p:spPr>
+            <a:xfrm>
+              <a:off x="2734056" y="3082858"/>
+              <a:ext cx="3831336" cy="685800"/>
+            </a:xfrm>
+            <a:prstGeom prst="rect">
+              <a:avLst/>
+            </a:prstGeom>
+            <a:solidFill>
+              <a:srgbClr val="008000"/>
+            </a:solidFill>
+            <a:ln>
+              <a:noFill/>
+            </a:ln>
+            <a:effectLst/>
+            <a:scene3d>
+              <a:camera prst="orthographicFront">
+                <a:rot lat="0" lon="0" rev="0"/>
+              </a:camera>
+              <a:lightRig rig="contrasting" dir="t">
+                <a:rot lat="0" lon="0" rev="7800000"/>
+              </a:lightRig>
+            </a:scene3d>
+            <a:sp3d>
+              <a:bevelT w="139700" h="139700"/>
+            </a:sp3d>
+          </p:spPr>
+          <p:style>
+            <a:lnRef idx="1">
+              <a:schemeClr val="accent4"/>
+            </a:lnRef>
+            <a:fillRef idx="3">
+              <a:schemeClr val="accent4"/>
+            </a:fillRef>
+            <a:effectRef idx="2">
+              <a:schemeClr val="accent4"/>
+            </a:effectRef>
+            <a:fontRef idx="minor">
+              <a:schemeClr val="lt1"/>
+            </a:fontRef>
+          </p:style>
+          <p:txBody>
+            <a:bodyPr rtlCol="0" anchor="ctr"/>
+            <a:lstStyle/>
+            <a:p>
+              <a:pPr algn="ctr"/>
+              <a:r>
+                <a:rPr lang="en-US" b="1" dirty="0" smtClean="0">
+                  <a:solidFill>
+                    <a:srgbClr val="FFFF00"/>
+                  </a:solidFill>
+                </a:rPr>
+                <a:t>COLOR RAM</a:t>
+              </a:r>
+            </a:p>
+            <a:p>
+              <a:pPr algn="ctr"/>
+              <a:r>
+                <a:rPr lang="en-US" dirty="0" smtClean="0"/>
+                <a:t>$B000-$BFFF</a:t>
+              </a:r>
+              <a:endParaRPr lang="en-US" dirty="0"/>
+            </a:p>
+          </p:txBody>
+        </p:sp>
+        <p:sp>
+          <p:nvSpPr>
+            <p:cNvPr id="10" name="Rectangle 9"/>
+            <p:cNvSpPr/>
+            <p:nvPr/>
+          </p:nvSpPr>
+          <p:spPr>
+            <a:xfrm>
+              <a:off x="2734056" y="3768658"/>
+              <a:ext cx="3827024" cy="685800"/>
+            </a:xfrm>
+            <a:prstGeom prst="rect">
+              <a:avLst/>
+            </a:prstGeom>
+            <a:solidFill>
+              <a:srgbClr val="008000"/>
+            </a:solidFill>
+            <a:ln>
+              <a:noFill/>
+            </a:ln>
+            <a:effectLst/>
+            <a:scene3d>
+              <a:camera prst="orthographicFront">
+                <a:rot lat="0" lon="0" rev="0"/>
+              </a:camera>
+              <a:lightRig rig="contrasting" dir="t">
+                <a:rot lat="0" lon="0" rev="7800000"/>
+              </a:lightRig>
+            </a:scene3d>
+            <a:sp3d>
+              <a:bevelT w="139700" h="139700"/>
+            </a:sp3d>
+          </p:spPr>
+          <p:style>
+            <a:lnRef idx="2">
+              <a:schemeClr val="accent1">
+                <a:shade val="50000"/>
+              </a:schemeClr>
+            </a:lnRef>
+            <a:fillRef idx="1">
+              <a:schemeClr val="accent1"/>
+            </a:fillRef>
+            <a:effectRef idx="0">
+              <a:schemeClr val="accent1"/>
+            </a:effectRef>
+            <a:fontRef idx="minor">
+              <a:schemeClr val="lt1"/>
+            </a:fontRef>
+          </p:style>
+          <p:txBody>
+            <a:bodyPr rtlCol="0" anchor="ctr"/>
+            <a:lstStyle/>
+            <a:p>
+              <a:pPr algn="ctr"/>
+              <a:r>
+                <a:rPr lang="en-US" b="1" dirty="0" smtClean="0">
+                  <a:solidFill>
+                    <a:srgbClr val="FFFF00"/>
+                  </a:solidFill>
+                </a:rPr>
+                <a:t>VIDEO RAM</a:t>
+              </a:r>
+            </a:p>
+            <a:p>
+              <a:pPr algn="ctr"/>
+              <a:r>
+                <a:rPr lang="en-US" dirty="0" smtClean="0">
+                  <a:solidFill>
+                    <a:schemeClr val="bg1"/>
+                  </a:solidFill>
+                </a:rPr>
+                <a:t>$A000-$AFFF</a:t>
+              </a:r>
+              <a:endParaRPr lang="en-US" dirty="0">
                 <a:solidFill>
-                  <a:srgbClr val="FFFF00"/>
+                  <a:schemeClr val="bg1"/>
                 </a:solidFill>
-              </a:rPr>
-              <a:t>CHARACTER GENERATOR ROM</a:t>
-            </a:r>
-          </a:p>
-          <a:p>
-            <a:pPr algn="ctr"/>
-            <a:r>
-              <a:rPr lang="en-US" dirty="0" smtClean="0">
+              </a:endParaRPr>
+            </a:p>
+          </p:txBody>
+        </p:sp>
+        <p:sp>
+          <p:nvSpPr>
+            <p:cNvPr id="12" name="Rectangle 11"/>
+            <p:cNvSpPr/>
+            <p:nvPr/>
+          </p:nvSpPr>
+          <p:spPr>
+            <a:xfrm>
+              <a:off x="2734056" y="2416513"/>
+              <a:ext cx="3831336" cy="685800"/>
+            </a:xfrm>
+            <a:prstGeom prst="rect">
+              <a:avLst/>
+            </a:prstGeom>
+            <a:solidFill>
+              <a:srgbClr val="008000"/>
+            </a:solidFill>
+            <a:ln>
+              <a:noFill/>
+            </a:ln>
+            <a:effectLst/>
+            <a:scene3d>
+              <a:camera prst="orthographicFront">
+                <a:rot lat="0" lon="0" rev="0"/>
+              </a:camera>
+              <a:lightRig rig="contrasting" dir="t">
+                <a:rot lat="0" lon="0" rev="7800000"/>
+              </a:lightRig>
+            </a:scene3d>
+            <a:sp3d>
+              <a:bevelT w="139700" h="139700"/>
+            </a:sp3d>
+          </p:spPr>
+          <p:style>
+            <a:lnRef idx="1">
+              <a:schemeClr val="accent4"/>
+            </a:lnRef>
+            <a:fillRef idx="3">
+              <a:schemeClr val="accent4"/>
+            </a:fillRef>
+            <a:effectRef idx="2">
+              <a:schemeClr val="accent4"/>
+            </a:effectRef>
+            <a:fontRef idx="minor">
+              <a:schemeClr val="lt1"/>
+            </a:fontRef>
+          </p:style>
+          <p:txBody>
+            <a:bodyPr rtlCol="0" anchor="ctr"/>
+            <a:lstStyle/>
+            <a:p>
+              <a:pPr algn="ctr"/>
+              <a:r>
+                <a:rPr lang="en-US" b="1" dirty="0" smtClean="0">
+                  <a:solidFill>
+                    <a:srgbClr val="FFFF00"/>
+                  </a:solidFill>
+                </a:rPr>
+                <a:t>CHARACTER GENERATOR ROM</a:t>
+              </a:r>
+            </a:p>
+            <a:p>
+              <a:pPr algn="ctr"/>
+              <a:r>
+                <a:rPr lang="en-US" dirty="0" smtClean="0">
+                  <a:solidFill>
+                    <a:schemeClr val="bg1"/>
+                  </a:solidFill>
+                </a:rPr>
+                <a:t>$C000-$C7FF</a:t>
+              </a:r>
+              <a:endParaRPr lang="en-US" dirty="0">
+                <a:solidFill>
+                  <a:schemeClr val="bg1"/>
+                </a:solidFill>
+              </a:endParaRPr>
+            </a:p>
+          </p:txBody>
+        </p:sp>
+        <p:sp>
+          <p:nvSpPr>
+            <p:cNvPr id="13" name="Rectangle 12"/>
+            <p:cNvSpPr/>
+            <p:nvPr/>
+          </p:nvSpPr>
+          <p:spPr>
+            <a:xfrm>
+              <a:off x="2734056" y="1730713"/>
+              <a:ext cx="3831336" cy="685800"/>
+            </a:xfrm>
+            <a:prstGeom prst="rect">
+              <a:avLst/>
+            </a:prstGeom>
+            <a:solidFill>
+              <a:srgbClr val="008000"/>
+            </a:solidFill>
+            <a:ln>
+              <a:noFill/>
+            </a:ln>
+            <a:effectLst/>
+            <a:scene3d>
+              <a:camera prst="orthographicFront">
+                <a:rot lat="0" lon="0" rev="0"/>
+              </a:camera>
+              <a:lightRig rig="contrasting" dir="t">
+                <a:rot lat="0" lon="0" rev="7800000"/>
+              </a:lightRig>
+            </a:scene3d>
+            <a:sp3d>
+              <a:bevelT w="139700" h="139700"/>
+            </a:sp3d>
+          </p:spPr>
+          <p:style>
+            <a:lnRef idx="1">
+              <a:schemeClr val="accent4"/>
+            </a:lnRef>
+            <a:fillRef idx="3">
+              <a:schemeClr val="accent4"/>
+            </a:fillRef>
+            <a:effectRef idx="2">
+              <a:schemeClr val="accent4"/>
+            </a:effectRef>
+            <a:fontRef idx="minor">
+              <a:schemeClr val="lt1"/>
+            </a:fontRef>
+          </p:style>
+          <p:txBody>
+            <a:bodyPr rtlCol="0" anchor="ctr"/>
+            <a:lstStyle/>
+            <a:p>
+              <a:pPr algn="ctr"/>
+              <a:endParaRPr lang="en-US" dirty="0" smtClean="0">
                 <a:solidFill>
                   <a:schemeClr val="tx1"/>
                 </a:solidFill>
-              </a:rPr>
-              <a:t>$C000-$C7FF</a:t>
-            </a:r>
-            <a:endParaRPr lang="en-US" dirty="0">
-              <a:solidFill>
-                <a:schemeClr val="tx1"/>
-              </a:solidFill>
-            </a:endParaRPr>
-          </a:p>
-        </p:txBody>
-      </p:sp>
-      <p:sp>
-        <p:nvSpPr>
-          <p:cNvPr id="13" name="Rectangle 12"/>
-          <p:cNvSpPr/>
-          <p:nvPr/>
-        </p:nvSpPr>
-        <p:spPr>
-          <a:xfrm>
-            <a:off x="2734056" y="1730713"/>
-            <a:ext cx="3810000" cy="685800"/>
-          </a:xfrm>
-          <a:prstGeom prst="rect">
-            <a:avLst/>
-          </a:prstGeom>
-          <a:solidFill>
-            <a:srgbClr val="00F000"/>
-          </a:solidFill>
-          <a:ln>
-            <a:noFill/>
-          </a:ln>
-          <a:effectLst/>
-          <a:scene3d>
-            <a:camera prst="orthographicFront">
-              <a:rot lat="0" lon="0" rev="0"/>
-            </a:camera>
-            <a:lightRig rig="contrasting" dir="t">
-              <a:rot lat="0" lon="0" rev="7800000"/>
-            </a:lightRig>
-          </a:scene3d>
-          <a:sp3d>
-            <a:bevelT w="139700" h="139700"/>
-          </a:sp3d>
-        </p:spPr>
-        <p:style>
-          <a:lnRef idx="1">
-            <a:schemeClr val="accent4"/>
-          </a:lnRef>
-          <a:fillRef idx="3">
-            <a:schemeClr val="accent4"/>
-          </a:fillRef>
-          <a:effectRef idx="2">
-            <a:schemeClr val="accent4"/>
-          </a:effectRef>
-          <a:fontRef idx="minor">
-            <a:schemeClr val="lt1"/>
-          </a:fontRef>
-        </p:style>
-        <p:txBody>
-          <a:bodyPr rtlCol="0" anchor="ctr"/>
-          <a:lstStyle/>
-          <a:p>
-            <a:pPr algn="ctr"/>
-            <a:r>
-              <a:rPr lang="en-US" dirty="0" smtClean="0">
-                <a:solidFill>
-                  <a:srgbClr val="00C000"/>
-                </a:solidFill>
-              </a:rPr>
-              <a:t>$C800-$CFFF</a:t>
-            </a:r>
-            <a:endParaRPr lang="en-US" dirty="0">
-              <a:solidFill>
-                <a:srgbClr val="00C000"/>
-              </a:solidFill>
-            </a:endParaRPr>
-          </a:p>
-        </p:txBody>
-      </p:sp>
-      <p:sp>
-        <p:nvSpPr>
-          <p:cNvPr id="14" name="Rectangle 13"/>
-          <p:cNvSpPr/>
-          <p:nvPr/>
-        </p:nvSpPr>
-        <p:spPr>
-          <a:xfrm>
-            <a:off x="2734056" y="1044913"/>
-            <a:ext cx="3810000" cy="685800"/>
-          </a:xfrm>
-          <a:prstGeom prst="rect">
-            <a:avLst/>
-          </a:prstGeom>
-          <a:solidFill>
-            <a:srgbClr val="00FF40"/>
-          </a:solidFill>
-          <a:ln>
-            <a:noFill/>
-          </a:ln>
-          <a:effectLst/>
-          <a:scene3d>
-            <a:camera prst="orthographicFront">
-              <a:rot lat="0" lon="0" rev="0"/>
-            </a:camera>
-            <a:lightRig rig="contrasting" dir="t">
-              <a:rot lat="0" lon="0" rev="7800000"/>
-            </a:lightRig>
-          </a:scene3d>
-          <a:sp3d>
-            <a:bevelT w="139700" h="139700"/>
-          </a:sp3d>
-        </p:spPr>
-        <p:style>
-          <a:lnRef idx="1">
-            <a:schemeClr val="accent4"/>
-          </a:lnRef>
-          <a:fillRef idx="3">
-            <a:schemeClr val="accent4"/>
-          </a:fillRef>
-          <a:effectRef idx="2">
-            <a:schemeClr val="accent4"/>
-          </a:effectRef>
-          <a:fontRef idx="minor">
-            <a:schemeClr val="lt1"/>
-          </a:fontRef>
-        </p:style>
-        <p:txBody>
-          <a:bodyPr rtlCol="0" anchor="ctr"/>
-          <a:lstStyle/>
-          <a:p>
-            <a:pPr algn="ctr"/>
-            <a:r>
-              <a:rPr lang="en-US" b="1" dirty="0" smtClean="0">
-                <a:solidFill>
-                  <a:srgbClr val="C00000"/>
-                </a:solidFill>
-              </a:rPr>
-              <a:t>KERNEL</a:t>
-            </a:r>
-          </a:p>
-          <a:p>
-            <a:pPr algn="ctr"/>
-            <a:r>
-              <a:rPr lang="en-US" dirty="0" smtClean="0">
+              </a:endParaRPr>
+            </a:p>
+            <a:p>
+              <a:pPr algn="ctr"/>
+              <a:r>
+                <a:rPr lang="en-US" b="1" dirty="0" smtClean="0">
+                  <a:solidFill>
+                    <a:srgbClr val="FFFF00"/>
+                  </a:solidFill>
+                </a:rPr>
+                <a:t>COMMON STACK AREA</a:t>
+              </a:r>
+            </a:p>
+            <a:p>
+              <a:pPr algn="ctr"/>
+              <a:r>
+                <a:rPr lang="en-US" dirty="0" smtClean="0">
+                  <a:solidFill>
+                    <a:schemeClr val="bg1"/>
+                  </a:solidFill>
+                </a:rPr>
+                <a:t>$C800-</a:t>
+              </a:r>
+              <a:r>
+                <a:rPr lang="en-US" dirty="0" smtClean="0">
+                  <a:solidFill>
+                    <a:schemeClr val="bg1"/>
+                  </a:solidFill>
+                </a:rPr>
+                <a:t>$</a:t>
+              </a:r>
+              <a:r>
+                <a:rPr lang="en-US" dirty="0" smtClean="0">
+                  <a:solidFill>
+                    <a:schemeClr val="bg1"/>
+                  </a:solidFill>
+                </a:rPr>
+                <a:t>CFFF</a:t>
+              </a:r>
+            </a:p>
+            <a:p>
+              <a:pPr algn="ctr"/>
+              <a:endParaRPr lang="en-US" dirty="0">
                 <a:solidFill>
                   <a:schemeClr val="tx1"/>
                 </a:solidFill>
-              </a:rPr>
-              <a:t>$D000-$FFFF</a:t>
-            </a:r>
-            <a:endParaRPr lang="en-US" dirty="0">
-              <a:solidFill>
-                <a:schemeClr val="tx1"/>
-              </a:solidFill>
-            </a:endParaRPr>
-          </a:p>
-        </p:txBody>
-      </p:sp>
+              </a:endParaRPr>
+            </a:p>
+          </p:txBody>
+        </p:sp>
+        <p:sp>
+          <p:nvSpPr>
+            <p:cNvPr id="14" name="Rectangle 13"/>
+            <p:cNvSpPr/>
+            <p:nvPr/>
+          </p:nvSpPr>
+          <p:spPr>
+            <a:xfrm>
+              <a:off x="2734056" y="1044913"/>
+              <a:ext cx="3831336" cy="685800"/>
+            </a:xfrm>
+            <a:prstGeom prst="rect">
+              <a:avLst/>
+            </a:prstGeom>
+            <a:solidFill>
+              <a:srgbClr val="008000"/>
+            </a:solidFill>
+            <a:ln>
+              <a:noFill/>
+            </a:ln>
+            <a:effectLst/>
+            <a:scene3d>
+              <a:camera prst="orthographicFront">
+                <a:rot lat="0" lon="0" rev="0"/>
+              </a:camera>
+              <a:lightRig rig="contrasting" dir="t">
+                <a:rot lat="0" lon="0" rev="7800000"/>
+              </a:lightRig>
+            </a:scene3d>
+            <a:sp3d>
+              <a:bevelT w="139700" h="139700"/>
+            </a:sp3d>
+          </p:spPr>
+          <p:style>
+            <a:lnRef idx="1">
+              <a:schemeClr val="accent4"/>
+            </a:lnRef>
+            <a:fillRef idx="3">
+              <a:schemeClr val="accent4"/>
+            </a:fillRef>
+            <a:effectRef idx="2">
+              <a:schemeClr val="accent4"/>
+            </a:effectRef>
+            <a:fontRef idx="minor">
+              <a:schemeClr val="lt1"/>
+            </a:fontRef>
+          </p:style>
+          <p:txBody>
+            <a:bodyPr rtlCol="0" anchor="ctr"/>
+            <a:lstStyle/>
+            <a:p>
+              <a:pPr algn="ctr"/>
+              <a:r>
+                <a:rPr lang="en-US" b="1" dirty="0" smtClean="0">
+                  <a:solidFill>
+                    <a:srgbClr val="FFFF00"/>
+                  </a:solidFill>
+                </a:rPr>
+                <a:t>KERNEL</a:t>
+              </a:r>
+            </a:p>
+            <a:p>
+              <a:pPr algn="ctr"/>
+              <a:r>
+                <a:rPr lang="en-US" dirty="0" smtClean="0">
+                  <a:solidFill>
+                    <a:schemeClr val="bg1"/>
+                  </a:solidFill>
+                </a:rPr>
+                <a:t>$D000-$FFFF</a:t>
+              </a:r>
+              <a:endParaRPr lang="en-US" dirty="0">
+                <a:solidFill>
+                  <a:schemeClr val="bg1"/>
+                </a:solidFill>
+              </a:endParaRPr>
+            </a:p>
+          </p:txBody>
+        </p:sp>
+      </p:grpSp>
     </p:spTree>
     <p:extLst>
       <p:ext uri="{BB962C8B-B14F-4D97-AF65-F5344CB8AC3E}">

</xml_diff>

<commit_message>
keyboard handler stub and i/o registers and memory layout
</commit_message>
<xml_diff>
--- a/doc/PixieVM Memory Layout.pptx
+++ b/doc/PixieVM Memory Layout.pptx
@@ -106,7 +106,7 @@
   </p:defaultTextStyle>
   <p:extLst>
     <p:ext uri="{EFAFB233-063F-42B5-8137-9DF3F51BA10A}">
-      <p15:sldGuideLst xmlns:p15="http://schemas.microsoft.com/office/powerpoint/2012/main" xmlns="">
+      <p15:sldGuideLst xmlns="" xmlns:p15="http://schemas.microsoft.com/office/powerpoint/2012/main">
         <p15:guide id="1" orient="horz" pos="2160">
           <p15:clr>
             <a:srgbClr val="A4A3A4"/>
@@ -304,7 +304,7 @@
           <a:p>
             <a:fld id="{ACE72DFE-57C9-42FC-8C16-6187F164E2A6}" type="datetimeFigureOut">
               <a:rPr lang="en-US" smtClean="0"/>
-              <a:t>11/17/2013</a:t>
+              <a:t>11/23/2013</a:t>
             </a:fld>
             <a:endParaRPr lang="en-US"/>
           </a:p>
@@ -474,7 +474,7 @@
           <a:p>
             <a:fld id="{ACE72DFE-57C9-42FC-8C16-6187F164E2A6}" type="datetimeFigureOut">
               <a:rPr lang="en-US" smtClean="0"/>
-              <a:t>11/17/2013</a:t>
+              <a:t>11/23/2013</a:t>
             </a:fld>
             <a:endParaRPr lang="en-US"/>
           </a:p>
@@ -654,7 +654,7 @@
           <a:p>
             <a:fld id="{ACE72DFE-57C9-42FC-8C16-6187F164E2A6}" type="datetimeFigureOut">
               <a:rPr lang="en-US" smtClean="0"/>
-              <a:t>11/17/2013</a:t>
+              <a:t>11/23/2013</a:t>
             </a:fld>
             <a:endParaRPr lang="en-US"/>
           </a:p>
@@ -824,7 +824,7 @@
           <a:p>
             <a:fld id="{ACE72DFE-57C9-42FC-8C16-6187F164E2A6}" type="datetimeFigureOut">
               <a:rPr lang="en-US" smtClean="0"/>
-              <a:t>11/17/2013</a:t>
+              <a:t>11/23/2013</a:t>
             </a:fld>
             <a:endParaRPr lang="en-US"/>
           </a:p>
@@ -1070,7 +1070,7 @@
           <a:p>
             <a:fld id="{ACE72DFE-57C9-42FC-8C16-6187F164E2A6}" type="datetimeFigureOut">
               <a:rPr lang="en-US" smtClean="0"/>
-              <a:t>11/17/2013</a:t>
+              <a:t>11/23/2013</a:t>
             </a:fld>
             <a:endParaRPr lang="en-US"/>
           </a:p>
@@ -1358,7 +1358,7 @@
           <a:p>
             <a:fld id="{ACE72DFE-57C9-42FC-8C16-6187F164E2A6}" type="datetimeFigureOut">
               <a:rPr lang="en-US" smtClean="0"/>
-              <a:t>11/17/2013</a:t>
+              <a:t>11/23/2013</a:t>
             </a:fld>
             <a:endParaRPr lang="en-US"/>
           </a:p>
@@ -1780,7 +1780,7 @@
           <a:p>
             <a:fld id="{ACE72DFE-57C9-42FC-8C16-6187F164E2A6}" type="datetimeFigureOut">
               <a:rPr lang="en-US" smtClean="0"/>
-              <a:t>11/17/2013</a:t>
+              <a:t>11/23/2013</a:t>
             </a:fld>
             <a:endParaRPr lang="en-US"/>
           </a:p>
@@ -1898,7 +1898,7 @@
           <a:p>
             <a:fld id="{ACE72DFE-57C9-42FC-8C16-6187F164E2A6}" type="datetimeFigureOut">
               <a:rPr lang="en-US" smtClean="0"/>
-              <a:t>11/17/2013</a:t>
+              <a:t>11/23/2013</a:t>
             </a:fld>
             <a:endParaRPr lang="en-US"/>
           </a:p>
@@ -1993,7 +1993,7 @@
           <a:p>
             <a:fld id="{ACE72DFE-57C9-42FC-8C16-6187F164E2A6}" type="datetimeFigureOut">
               <a:rPr lang="en-US" smtClean="0"/>
-              <a:t>11/17/2013</a:t>
+              <a:t>11/23/2013</a:t>
             </a:fld>
             <a:endParaRPr lang="en-US"/>
           </a:p>
@@ -2270,7 +2270,7 @@
           <a:p>
             <a:fld id="{ACE72DFE-57C9-42FC-8C16-6187F164E2A6}" type="datetimeFigureOut">
               <a:rPr lang="en-US" smtClean="0"/>
-              <a:t>11/17/2013</a:t>
+              <a:t>11/23/2013</a:t>
             </a:fld>
             <a:endParaRPr lang="en-US"/>
           </a:p>
@@ -2523,7 +2523,7 @@
           <a:p>
             <a:fld id="{ACE72DFE-57C9-42FC-8C16-6187F164E2A6}" type="datetimeFigureOut">
               <a:rPr lang="en-US" smtClean="0"/>
-              <a:t>11/17/2013</a:t>
+              <a:t>11/23/2013</a:t>
             </a:fld>
             <a:endParaRPr lang="en-US"/>
           </a:p>
@@ -2736,7 +2736,7 @@
           <a:p>
             <a:fld id="{ACE72DFE-57C9-42FC-8C16-6187F164E2A6}" type="datetimeFigureOut">
               <a:rPr lang="en-US" smtClean="0"/>
-              <a:t>11/17/2013</a:t>
+              <a:t>11/23/2013</a:t>
             </a:fld>
             <a:endParaRPr lang="en-US"/>
           </a:p>
@@ -3173,16 +3173,16 @@
       </p:sp>
       <p:grpSp>
         <p:nvGrpSpPr>
-          <p:cNvPr id="2" name="Group 1"/>
+          <p:cNvPr id="3" name="Group 2"/>
           <p:cNvGrpSpPr/>
           <p:nvPr/>
         </p:nvGrpSpPr>
         <p:grpSpPr>
           <a:xfrm>
-            <a:off x="2734056" y="1600200"/>
-            <a:ext cx="3831336" cy="4102639"/>
-            <a:chOff x="2734056" y="1044913"/>
-            <a:chExt cx="3831336" cy="4102639"/>
+            <a:off x="2725432" y="1752600"/>
+            <a:ext cx="3835648" cy="4788439"/>
+            <a:chOff x="2725432" y="1752600"/>
+            <a:chExt cx="3835648" cy="4788439"/>
           </a:xfrm>
         </p:grpSpPr>
         <p:sp>
@@ -3193,7 +3193,7 @@
           </p:nvSpPr>
           <p:spPr>
             <a:xfrm>
-              <a:off x="2734056" y="4454458"/>
+              <a:off x="2729744" y="5847945"/>
               <a:ext cx="3827024" cy="693094"/>
             </a:xfrm>
             <a:prstGeom prst="rect">
@@ -3254,15 +3254,7 @@
                     <a:schemeClr val="bg1"/>
                   </a:solidFill>
                 </a:rPr>
-                <a:t>$0000-</a:t>
-              </a:r>
-              <a:r>
-                <a:rPr lang="en-US" dirty="0" smtClean="0">
-                  <a:solidFill>
-                    <a:schemeClr val="bg1"/>
-                  </a:solidFill>
-                </a:rPr>
-                <a:t>$9FFF</a:t>
+                <a:t>$0000-$9FFF</a:t>
               </a:r>
               <a:endParaRPr lang="en-US" dirty="0">
                 <a:solidFill>
@@ -3280,7 +3272,7 @@
           </p:nvSpPr>
           <p:spPr>
             <a:xfrm>
-              <a:off x="2734056" y="3082858"/>
+              <a:off x="2729744" y="4476345"/>
               <a:ext cx="3831336" cy="685800"/>
             </a:xfrm>
             <a:prstGeom prst="rect">
@@ -3351,7 +3343,7 @@
           </p:nvSpPr>
           <p:spPr>
             <a:xfrm>
-              <a:off x="2734056" y="3768658"/>
+              <a:off x="2729744" y="5162145"/>
               <a:ext cx="3827024" cy="685800"/>
             </a:xfrm>
             <a:prstGeom prst="rect">
@@ -3432,7 +3424,7 @@
           </p:nvSpPr>
           <p:spPr>
             <a:xfrm>
-              <a:off x="2734056" y="2416513"/>
+              <a:off x="2729744" y="3810000"/>
               <a:ext cx="3831336" cy="685800"/>
             </a:xfrm>
             <a:prstGeom prst="rect">
@@ -3511,7 +3503,7 @@
           </p:nvSpPr>
           <p:spPr>
             <a:xfrm>
-              <a:off x="2734056" y="1730713"/>
+              <a:off x="2729744" y="3124200"/>
               <a:ext cx="3831336" cy="685800"/>
             </a:xfrm>
             <a:prstGeom prst="rect">
@@ -3580,23 +3572,7 @@
                     <a:schemeClr val="bg1"/>
                   </a:solidFill>
                 </a:rPr>
-                <a:t>$C800-</a:t>
-              </a:r>
-              <a:r>
-                <a:rPr lang="en-US" dirty="0" smtClean="0">
-                  <a:solidFill>
-                    <a:schemeClr val="bg1"/>
-                  </a:solidFill>
-                </a:rPr>
-                <a:t>$</a:t>
-              </a:r>
-              <a:r>
-                <a:rPr lang="en-US" dirty="0" smtClean="0">
-                  <a:solidFill>
-                    <a:schemeClr val="bg1"/>
-                  </a:solidFill>
-                </a:rPr>
-                <a:t>CFFF</a:t>
+                <a:t>$C800-$CFFF</a:t>
               </a:r>
             </a:p>
             <a:p>
@@ -3617,7 +3593,7 @@
           </p:nvSpPr>
           <p:spPr>
             <a:xfrm>
-              <a:off x="2734056" y="1044913"/>
+              <a:off x="2725432" y="1752600"/>
               <a:ext cx="3831336" cy="685800"/>
             </a:xfrm>
             <a:prstGeom prst="rect">
@@ -3678,7 +3654,107 @@
                     <a:schemeClr val="bg1"/>
                   </a:solidFill>
                 </a:rPr>
-                <a:t>$D000-$FFFF</a:t>
+                <a:t>$E000-</a:t>
+              </a:r>
+              <a:r>
+                <a:rPr lang="en-US" dirty="0" smtClean="0">
+                  <a:solidFill>
+                    <a:schemeClr val="bg1"/>
+                  </a:solidFill>
+                </a:rPr>
+                <a:t>$FFFF</a:t>
+              </a:r>
+              <a:endParaRPr lang="en-US" dirty="0">
+                <a:solidFill>
+                  <a:schemeClr val="bg1"/>
+                </a:solidFill>
+              </a:endParaRPr>
+            </a:p>
+          </p:txBody>
+        </p:sp>
+        <p:sp>
+          <p:nvSpPr>
+            <p:cNvPr id="11" name="Rectangle 10"/>
+            <p:cNvSpPr/>
+            <p:nvPr/>
+          </p:nvSpPr>
+          <p:spPr>
+            <a:xfrm>
+              <a:off x="2729744" y="2438400"/>
+              <a:ext cx="3831336" cy="685800"/>
+            </a:xfrm>
+            <a:prstGeom prst="rect">
+              <a:avLst/>
+            </a:prstGeom>
+            <a:solidFill>
+              <a:srgbClr val="008000"/>
+            </a:solidFill>
+            <a:ln>
+              <a:noFill/>
+            </a:ln>
+            <a:effectLst/>
+            <a:scene3d>
+              <a:camera prst="orthographicFront">
+                <a:rot lat="0" lon="0" rev="0"/>
+              </a:camera>
+              <a:lightRig rig="contrasting" dir="t">
+                <a:rot lat="0" lon="0" rev="7800000"/>
+              </a:lightRig>
+            </a:scene3d>
+            <a:sp3d>
+              <a:bevelT w="139700" h="139700"/>
+            </a:sp3d>
+          </p:spPr>
+          <p:style>
+            <a:lnRef idx="1">
+              <a:schemeClr val="accent4"/>
+            </a:lnRef>
+            <a:fillRef idx="3">
+              <a:schemeClr val="accent4"/>
+            </a:fillRef>
+            <a:effectRef idx="2">
+              <a:schemeClr val="accent4"/>
+            </a:effectRef>
+            <a:fontRef idx="minor">
+              <a:schemeClr val="lt1"/>
+            </a:fontRef>
+          </p:style>
+          <p:txBody>
+            <a:bodyPr rtlCol="0" anchor="ctr"/>
+            <a:lstStyle/>
+            <a:p>
+              <a:pPr algn="ctr"/>
+              <a:r>
+                <a:rPr lang="en-US" b="1" dirty="0" smtClean="0">
+                  <a:solidFill>
+                    <a:srgbClr val="FFFF00"/>
+                  </a:solidFill>
+                </a:rPr>
+                <a:t>I/O REGISTERS</a:t>
+              </a:r>
+              <a:endParaRPr lang="en-US" b="1" dirty="0" smtClean="0">
+                <a:solidFill>
+                  <a:srgbClr val="FFFF00"/>
+                </a:solidFill>
+              </a:endParaRPr>
+            </a:p>
+            <a:p>
+              <a:pPr algn="ctr"/>
+              <a:r>
+                <a:rPr lang="en-US" dirty="0" smtClean="0">
+                  <a:solidFill>
+                    <a:schemeClr val="bg1"/>
+                  </a:solidFill>
+                </a:rPr>
+                <a:t>$D000-</a:t>
+              </a:r>
+              <a:r>
+                <a:rPr lang="en-US" dirty="0" smtClean="0">
+                  <a:solidFill>
+                    <a:schemeClr val="bg1"/>
+                  </a:solidFill>
+                </a:rPr>
+                <a:t>$DFFF</a:t>
               </a:r>
               <a:endParaRPr lang="en-US" dirty="0">
                 <a:solidFill>

</xml_diff>